<commit_message>
Update PPT remove views
</commit_message>
<xml_diff>
--- a/PowerPoint/JobCorse - CakePHP.pptx
+++ b/PowerPoint/JobCorse - CakePHP.pptx
@@ -60,8 +60,6 @@
     <p:sldId id="299" r:id="rId54"/>
     <p:sldId id="300" r:id="rId55"/>
     <p:sldId id="301" r:id="rId56"/>
-    <p:sldId id="312" r:id="rId57"/>
-    <p:sldId id="313" r:id="rId58"/>
   </p:sldIdLst>
   <p:sldSz cx="12192000" cy="6858000"/>
   <p:notesSz cx="6858000" cy="9144000"/>
@@ -51110,321 +51108,6 @@
 </p:sld>
 </file>
 
-<file path=ppt/slides/slide56.xml><?xml version="1.0" encoding="utf-8"?>
-<p:sld xmlns:a="http://schemas.openxmlformats.org/drawingml/2006/main" xmlns:r="http://schemas.openxmlformats.org/officeDocument/2006/relationships" xmlns:p="http://schemas.openxmlformats.org/presentationml/2006/main">
-  <p:cSld>
-    <p:spTree>
-      <p:nvGrpSpPr>
-        <p:cNvPr id="1" name=""/>
-        <p:cNvGrpSpPr/>
-        <p:nvPr/>
-      </p:nvGrpSpPr>
-      <p:grpSpPr>
-        <a:xfrm>
-          <a:off x="0" y="0"/>
-          <a:ext cx="0" cy="0"/>
-          <a:chOff x="0" y="0"/>
-          <a:chExt cx="0" cy="0"/>
-        </a:xfrm>
-      </p:grpSpPr>
-      <p:sp>
-        <p:nvSpPr>
-          <p:cNvPr id="4" name="Rectangle 3">
-            <a:extLst>
-              <a:ext uri="{FF2B5EF4-FFF2-40B4-BE49-F238E27FC236}">
-                <a16:creationId xmlns:a16="http://schemas.microsoft.com/office/drawing/2014/main" id="{BDC6B1A6-926A-4D3F-A56F-4A806F45B943}"/>
-              </a:ext>
-            </a:extLst>
-          </p:cNvPr>
-          <p:cNvSpPr/>
-          <p:nvPr/>
-        </p:nvSpPr>
-        <p:spPr>
-          <a:xfrm>
-            <a:off x="7464614" y="1783959"/>
-            <a:ext cx="4087306" cy="2889114"/>
-          </a:xfrm>
-          <a:prstGeom prst="rect">
-            <a:avLst/>
-          </a:prstGeom>
-        </p:spPr>
-        <p:style>
-          <a:lnRef idx="2">
-            <a:schemeClr val="accent1">
-              <a:shade val="50000"/>
-            </a:schemeClr>
-          </a:lnRef>
-          <a:fillRef idx="1">
-            <a:schemeClr val="accent1"/>
-          </a:fillRef>
-          <a:effectRef idx="0">
-            <a:schemeClr val="accent1"/>
-          </a:effectRef>
-          <a:fontRef idx="minor">
-            <a:schemeClr val="lt1"/>
-          </a:fontRef>
-        </p:style>
-        <p:txBody>
-          <a:bodyPr vert="horz" lIns="91440" tIns="45720" rIns="91440" bIns="45720" rtlCol="0" anchor="b">
-            <a:normAutofit/>
-          </a:bodyPr>
-          <a:lstStyle/>
-          <a:p>
-            <a:pPr defTabSz="914400">
-              <a:lnSpc>
-                <a:spcPct val="90000"/>
-              </a:lnSpc>
-              <a:spcBef>
-                <a:spcPct val="0"/>
-              </a:spcBef>
-              <a:spcAft>
-                <a:spcPts val="600"/>
-              </a:spcAft>
-            </a:pPr>
-            <a:r>
-              <a:rPr lang="en-US" sz="5400" dirty="0">
-                <a:solidFill>
-                  <a:schemeClr val="tx1"/>
-                </a:solidFill>
-                <a:latin typeface="+mj-lt"/>
-                <a:ea typeface="+mj-ea"/>
-                <a:cs typeface="+mj-cs"/>
-              </a:rPr>
-              <a:t>Views</a:t>
-            </a:r>
-          </a:p>
-          <a:p>
-            <a:pPr defTabSz="914400">
-              <a:lnSpc>
-                <a:spcPct val="90000"/>
-              </a:lnSpc>
-              <a:spcBef>
-                <a:spcPct val="0"/>
-              </a:spcBef>
-              <a:spcAft>
-                <a:spcPts val="600"/>
-              </a:spcAft>
-            </a:pPr>
-            <a:endParaRPr lang="en-US" b="1" dirty="0"/>
-          </a:p>
-          <a:p>
-            <a:pPr defTabSz="914400">
-              <a:lnSpc>
-                <a:spcPct val="90000"/>
-              </a:lnSpc>
-              <a:spcBef>
-                <a:spcPct val="0"/>
-              </a:spcBef>
-              <a:spcAft>
-                <a:spcPts val="600"/>
-              </a:spcAft>
-            </a:pPr>
-            <a:endParaRPr lang="en-US" b="1" dirty="0"/>
-          </a:p>
-          <a:p>
-            <a:pPr defTabSz="914400">
-              <a:lnSpc>
-                <a:spcPct val="90000"/>
-              </a:lnSpc>
-              <a:spcBef>
-                <a:spcPct val="0"/>
-              </a:spcBef>
-              <a:spcAft>
-                <a:spcPts val="600"/>
-              </a:spcAft>
-            </a:pPr>
-            <a:r>
-              <a:rPr lang="en-US" b="1" dirty="0"/>
-              <a:t>templates/</a:t>
-            </a:r>
-            <a:endParaRPr lang="en-US" sz="5400" dirty="0">
-              <a:solidFill>
-                <a:schemeClr val="tx1"/>
-              </a:solidFill>
-              <a:latin typeface="+mj-lt"/>
-              <a:ea typeface="+mj-ea"/>
-              <a:cs typeface="+mj-cs"/>
-            </a:endParaRPr>
-          </a:p>
-        </p:txBody>
-      </p:sp>
-      <p:pic>
-        <p:nvPicPr>
-          <p:cNvPr id="2" name="Picture 1">
-            <a:extLst>
-              <a:ext uri="{FF2B5EF4-FFF2-40B4-BE49-F238E27FC236}">
-                <a16:creationId xmlns:a16="http://schemas.microsoft.com/office/drawing/2014/main" id="{C4BD2F62-88FA-47BB-8BC6-5B8C3FEB0C49}"/>
-              </a:ext>
-            </a:extLst>
-          </p:cNvPr>
-          <p:cNvPicPr>
-            <a:picLocks noChangeAspect="1"/>
-          </p:cNvPicPr>
-          <p:nvPr/>
-        </p:nvPicPr>
-        <p:blipFill rotWithShape="1">
-          <a:blip r:embed="rId2">
-            <a:extLst>
-              <a:ext uri="{28A0092B-C50C-407E-A947-70E740481C1C}">
-                <a14:useLocalDpi xmlns:a14="http://schemas.microsoft.com/office/drawing/2010/main" val="0"/>
-              </a:ext>
-            </a:extLst>
-          </a:blip>
-          <a:srcRect/>
-          <a:stretch/>
-        </p:blipFill>
-        <p:spPr>
-          <a:xfrm>
-            <a:off x="1" y="10"/>
-            <a:ext cx="6808242" cy="6857990"/>
-          </a:xfrm>
-          <a:custGeom>
-            <a:avLst/>
-            <a:gdLst/>
-            <a:ahLst/>
-            <a:cxnLst/>
-            <a:rect l="l" t="t" r="r" b="b"/>
-            <a:pathLst>
-              <a:path w="7028495" h="6858000">
-                <a:moveTo>
-                  <a:pt x="0" y="0"/>
-                </a:moveTo>
-                <a:lnTo>
-                  <a:pt x="6915668" y="0"/>
-                </a:lnTo>
-                <a:lnTo>
-                  <a:pt x="6952411" y="219663"/>
-                </a:lnTo>
-                <a:cubicBezTo>
-                  <a:pt x="7002551" y="569921"/>
-                  <a:pt x="7028495" y="927986"/>
-                  <a:pt x="7028495" y="1292112"/>
-                </a:cubicBezTo>
-                <a:cubicBezTo>
-                  <a:pt x="7028495" y="3343346"/>
-                  <a:pt x="6205186" y="5202289"/>
-                  <a:pt x="4870994" y="6556512"/>
-                </a:cubicBezTo>
-                <a:lnTo>
-                  <a:pt x="4556185" y="6858000"/>
-                </a:lnTo>
-                <a:lnTo>
-                  <a:pt x="0" y="6858000"/>
-                </a:lnTo>
-                <a:close/>
-              </a:path>
-            </a:pathLst>
-          </a:custGeom>
-        </p:spPr>
-      </p:pic>
-    </p:spTree>
-    <p:extLst>
-      <p:ext uri="{BB962C8B-B14F-4D97-AF65-F5344CB8AC3E}">
-        <p14:creationId xmlns:p14="http://schemas.microsoft.com/office/powerpoint/2010/main" val="2333746429"/>
-      </p:ext>
-    </p:extLst>
-  </p:cSld>
-  <p:clrMapOvr>
-    <a:masterClrMapping/>
-  </p:clrMapOvr>
-</p:sld>
-</file>
-
-<file path=ppt/slides/slide57.xml><?xml version="1.0" encoding="utf-8"?>
-<p:sld xmlns:a="http://schemas.openxmlformats.org/drawingml/2006/main" xmlns:r="http://schemas.openxmlformats.org/officeDocument/2006/relationships" xmlns:p="http://schemas.openxmlformats.org/presentationml/2006/main">
-  <p:cSld>
-    <p:spTree>
-      <p:nvGrpSpPr>
-        <p:cNvPr id="1" name=""/>
-        <p:cNvGrpSpPr/>
-        <p:nvPr/>
-      </p:nvGrpSpPr>
-      <p:grpSpPr>
-        <a:xfrm>
-          <a:off x="0" y="0"/>
-          <a:ext cx="0" cy="0"/>
-          <a:chOff x="0" y="0"/>
-          <a:chExt cx="0" cy="0"/>
-        </a:xfrm>
-      </p:grpSpPr>
-      <p:sp>
-        <p:nvSpPr>
-          <p:cNvPr id="4" name="Rectangle 3">
-            <a:extLst>
-              <a:ext uri="{FF2B5EF4-FFF2-40B4-BE49-F238E27FC236}">
-                <a16:creationId xmlns:a16="http://schemas.microsoft.com/office/drawing/2014/main" id="{BDC6B1A6-926A-4D3F-A56F-4A806F45B943}"/>
-              </a:ext>
-            </a:extLst>
-          </p:cNvPr>
-          <p:cNvSpPr/>
-          <p:nvPr/>
-        </p:nvSpPr>
-        <p:spPr>
-          <a:xfrm>
-            <a:off x="0" y="2743200"/>
-            <a:ext cx="12192000" cy="1371600"/>
-          </a:xfrm>
-          <a:prstGeom prst="rect">
-            <a:avLst/>
-          </a:prstGeom>
-          <a:solidFill>
-            <a:schemeClr val="tx1"/>
-          </a:solidFill>
-        </p:spPr>
-        <p:style>
-          <a:lnRef idx="2">
-            <a:schemeClr val="accent1">
-              <a:shade val="50000"/>
-            </a:schemeClr>
-          </a:lnRef>
-          <a:fillRef idx="1">
-            <a:schemeClr val="accent1"/>
-          </a:fillRef>
-          <a:effectRef idx="0">
-            <a:schemeClr val="accent1"/>
-          </a:effectRef>
-          <a:fontRef idx="minor">
-            <a:schemeClr val="lt1"/>
-          </a:fontRef>
-        </p:style>
-        <p:txBody>
-          <a:bodyPr rtlCol="0" anchor="ctr"/>
-          <a:lstStyle/>
-          <a:p>
-            <a:pPr algn="ctr"/>
-            <a:r>
-              <a:rPr lang="en-US" sz="8000" dirty="0" err="1">
-                <a:solidFill>
-                  <a:schemeClr val="bg1"/>
-                </a:solidFill>
-                <a:latin typeface="Algerian" panose="04020705040A02060702" pitchFamily="82" charset="0"/>
-                <a:cs typeface="AngsanaUPC" panose="020B0502040204020203" pitchFamily="18" charset="-34"/>
-              </a:rPr>
-              <a:t>USERSCONTROLLER.php</a:t>
-            </a:r>
-            <a:endParaRPr lang="en-US" sz="8000" dirty="0">
-              <a:solidFill>
-                <a:schemeClr val="bg1"/>
-              </a:solidFill>
-              <a:latin typeface="Algerian" panose="04020705040A02060702" pitchFamily="82" charset="0"/>
-              <a:cs typeface="AngsanaUPC" panose="020B0502040204020203" pitchFamily="18" charset="-34"/>
-            </a:endParaRPr>
-          </a:p>
-        </p:txBody>
-      </p:sp>
-    </p:spTree>
-    <p:extLst>
-      <p:ext uri="{BB962C8B-B14F-4D97-AF65-F5344CB8AC3E}">
-        <p14:creationId xmlns:p14="http://schemas.microsoft.com/office/powerpoint/2010/main" val="1788130397"/>
-      </p:ext>
-    </p:extLst>
-  </p:cSld>
-  <p:clrMapOvr>
-    <a:masterClrMapping/>
-  </p:clrMapOvr>
-</p:sld>
-</file>
-
 <file path=ppt/slides/slide6.xml><?xml version="1.0" encoding="utf-8"?>
 <p:sld xmlns:a="http://schemas.openxmlformats.org/drawingml/2006/main" xmlns:r="http://schemas.openxmlformats.org/officeDocument/2006/relationships" xmlns:p="http://schemas.openxmlformats.org/presentationml/2006/main">
   <p:cSld>

</xml_diff>